<commit_message>
Fix: Corrected the live demo link in README and updated the slide deck
</commit_message>
<xml_diff>
--- a/project presentation slide.pptx
+++ b/project presentation slide.pptx
@@ -124,6 +124,11 @@
       </a:defRPr>
     </a:lvl9pPr>
   </p:defaultTextStyle>
+  <p:extLst>
+    <p:ext uri="{EFAFB233-063F-42B5-8137-9DF3F51BA10A}">
+      <p15:sldGuideLst xmlns:p15="http://schemas.microsoft.com/office/powerpoint/2012/main"/>
+    </p:ext>
+  </p:extLst>
 </p:presentation>
 </file>
 
@@ -872,7 +877,7 @@
           <a:p>
             <a:fld id="{3C23C64E-CF41-47DB-876F-558E4552A5DE}" type="datetimeFigureOut">
               <a:rPr lang="en-US" smtClean="0"/>
-              <a:t>5/24/2025</a:t>
+              <a:t>5/28/2025</a:t>
             </a:fld>
             <a:endParaRPr lang="en-US"/>
           </a:p>
@@ -1123,7 +1128,7 @@
           <a:p>
             <a:fld id="{3C23C64E-CF41-47DB-876F-558E4552A5DE}" type="datetimeFigureOut">
               <a:rPr lang="en-US" smtClean="0"/>
-              <a:t>5/24/2025</a:t>
+              <a:t>5/28/2025</a:t>
             </a:fld>
             <a:endParaRPr lang="en-US"/>
           </a:p>
@@ -1437,7 +1442,7 @@
           <a:p>
             <a:fld id="{3C23C64E-CF41-47DB-876F-558E4552A5DE}" type="datetimeFigureOut">
               <a:rPr lang="en-US" smtClean="0"/>
-              <a:t>5/24/2025</a:t>
+              <a:t>5/28/2025</a:t>
             </a:fld>
             <a:endParaRPr lang="en-US"/>
           </a:p>
@@ -1770,7 +1775,7 @@
           <a:p>
             <a:fld id="{3C23C64E-CF41-47DB-876F-558E4552A5DE}" type="datetimeFigureOut">
               <a:rPr lang="en-US" smtClean="0"/>
-              <a:t>5/24/2025</a:t>
+              <a:t>5/28/2025</a:t>
             </a:fld>
             <a:endParaRPr lang="en-US"/>
           </a:p>
@@ -2084,7 +2089,7 @@
           <a:p>
             <a:fld id="{3C23C64E-CF41-47DB-876F-558E4552A5DE}" type="datetimeFigureOut">
               <a:rPr lang="en-US" smtClean="0"/>
-              <a:t>5/24/2025</a:t>
+              <a:t>5/28/2025</a:t>
             </a:fld>
             <a:endParaRPr lang="en-US"/>
           </a:p>
@@ -2477,7 +2482,7 @@
           <a:p>
             <a:fld id="{3C23C64E-CF41-47DB-876F-558E4552A5DE}" type="datetimeFigureOut">
               <a:rPr lang="en-US" smtClean="0"/>
-              <a:t>5/24/2025</a:t>
+              <a:t>5/28/2025</a:t>
             </a:fld>
             <a:endParaRPr lang="en-US"/>
           </a:p>
@@ -2647,7 +2652,7 @@
           <a:p>
             <a:fld id="{3C23C64E-CF41-47DB-876F-558E4552A5DE}" type="datetimeFigureOut">
               <a:rPr lang="en-US" smtClean="0"/>
-              <a:t>5/24/2025</a:t>
+              <a:t>5/28/2025</a:t>
             </a:fld>
             <a:endParaRPr lang="en-US"/>
           </a:p>
@@ -2827,7 +2832,7 @@
           <a:p>
             <a:fld id="{3C23C64E-CF41-47DB-876F-558E4552A5DE}" type="datetimeFigureOut">
               <a:rPr lang="en-US" smtClean="0"/>
-              <a:t>5/24/2025</a:t>
+              <a:t>5/28/2025</a:t>
             </a:fld>
             <a:endParaRPr lang="en-US"/>
           </a:p>
@@ -2997,7 +3002,7 @@
           <a:p>
             <a:fld id="{3C23C64E-CF41-47DB-876F-558E4552A5DE}" type="datetimeFigureOut">
               <a:rPr lang="en-US" smtClean="0"/>
-              <a:t>5/24/2025</a:t>
+              <a:t>5/28/2025</a:t>
             </a:fld>
             <a:endParaRPr lang="en-US"/>
           </a:p>
@@ -3244,7 +3249,7 @@
           <a:p>
             <a:fld id="{3C23C64E-CF41-47DB-876F-558E4552A5DE}" type="datetimeFigureOut">
               <a:rPr lang="en-US" smtClean="0"/>
-              <a:t>5/24/2025</a:t>
+              <a:t>5/28/2025</a:t>
             </a:fld>
             <a:endParaRPr lang="en-US"/>
           </a:p>
@@ -3476,7 +3481,7 @@
           <a:p>
             <a:fld id="{3C23C64E-CF41-47DB-876F-558E4552A5DE}" type="datetimeFigureOut">
               <a:rPr lang="en-US" smtClean="0"/>
-              <a:t>5/24/2025</a:t>
+              <a:t>5/28/2025</a:t>
             </a:fld>
             <a:endParaRPr lang="en-US"/>
           </a:p>
@@ -3850,7 +3855,7 @@
           <a:p>
             <a:fld id="{3C23C64E-CF41-47DB-876F-558E4552A5DE}" type="datetimeFigureOut">
               <a:rPr lang="en-US" smtClean="0"/>
-              <a:t>5/24/2025</a:t>
+              <a:t>5/28/2025</a:t>
             </a:fld>
             <a:endParaRPr lang="en-US"/>
           </a:p>
@@ -3973,7 +3978,7 @@
           <a:p>
             <a:fld id="{3C23C64E-CF41-47DB-876F-558E4552A5DE}" type="datetimeFigureOut">
               <a:rPr lang="en-US" smtClean="0"/>
-              <a:t>5/24/2025</a:t>
+              <a:t>5/28/2025</a:t>
             </a:fld>
             <a:endParaRPr lang="en-US"/>
           </a:p>
@@ -4068,7 +4073,7 @@
           <a:p>
             <a:fld id="{3C23C64E-CF41-47DB-876F-558E4552A5DE}" type="datetimeFigureOut">
               <a:rPr lang="en-US" smtClean="0"/>
-              <a:t>5/24/2025</a:t>
+              <a:t>5/28/2025</a:t>
             </a:fld>
             <a:endParaRPr lang="en-US"/>
           </a:p>
@@ -4323,7 +4328,7 @@
           <a:p>
             <a:fld id="{3C23C64E-CF41-47DB-876F-558E4552A5DE}" type="datetimeFigureOut">
               <a:rPr lang="en-US" smtClean="0"/>
-              <a:t>5/24/2025</a:t>
+              <a:t>5/28/2025</a:t>
             </a:fld>
             <a:endParaRPr lang="en-US"/>
           </a:p>
@@ -4628,7 +4633,7 @@
           <a:p>
             <a:fld id="{3C23C64E-CF41-47DB-876F-558E4552A5DE}" type="datetimeFigureOut">
               <a:rPr lang="en-US" smtClean="0"/>
-              <a:t>5/24/2025</a:t>
+              <a:t>5/28/2025</a:t>
             </a:fld>
             <a:endParaRPr lang="en-US"/>
           </a:p>
@@ -5330,7 +5335,7 @@
           <a:p>
             <a:fld id="{3C23C64E-CF41-47DB-876F-558E4552A5DE}" type="datetimeFigureOut">
               <a:rPr lang="en-US" smtClean="0"/>
-              <a:t>5/24/2025</a:t>
+              <a:t>5/28/2025</a:t>
             </a:fld>
             <a:endParaRPr lang="en-US"/>
           </a:p>
@@ -10655,6 +10660,89 @@
             <a:endParaRPr lang="en-US" sz="3600" dirty="0"/>
           </a:p>
           <a:p>
+            <a:pPr marL="0" indent="0">
+              <a:buNone/>
+            </a:pPr>
+            <a:r>
+              <a:rPr lang="en-US" sz="3600" dirty="0"/>
+              <a:t>Live demo </a:t>
+            </a:r>
+            <a:r>
+              <a:rPr lang="en-US" sz="3600" dirty="0" err="1"/>
+              <a:t>link:</a:t>
+            </a:r>
+            <a:r>
+              <a:rPr lang="en-US" sz="1800" u="sng" kern="100" dirty="0" err="1">
+                <a:solidFill>
+                  <a:srgbClr val="0563C1"/>
+                </a:solidFill>
+                <a:effectLst/>
+                <a:latin typeface="Calibri" panose="020F0502020204030204" pitchFamily="34" charset="0"/>
+                <a:ea typeface="Calibri" panose="020F0502020204030204" pitchFamily="34" charset="0"/>
+                <a:cs typeface="Times New Roman" panose="02020603050405020304" pitchFamily="18" charset="0"/>
+                <a:hlinkClick r:id="rId3"/>
+              </a:rPr>
+              <a:t>https</a:t>
+            </a:r>
+            <a:r>
+              <a:rPr lang="en-US" sz="1800" u="sng" kern="100" dirty="0">
+                <a:solidFill>
+                  <a:srgbClr val="0563C1"/>
+                </a:solidFill>
+                <a:effectLst/>
+                <a:latin typeface="Calibri" panose="020F0502020204030204" pitchFamily="34" charset="0"/>
+                <a:ea typeface="Calibri" panose="020F0502020204030204" pitchFamily="34" charset="0"/>
+                <a:cs typeface="Times New Roman" panose="02020603050405020304" pitchFamily="18" charset="0"/>
+                <a:hlinkClick r:id="rId3"/>
+              </a:rPr>
+              <a:t>://diabetes-prediction-app-m6qd.o nrender.com/</a:t>
+            </a:r>
+            <a:endParaRPr lang="en-US" sz="1800" kern="100" dirty="0">
+              <a:effectLst/>
+              <a:latin typeface="Calibri" panose="020F0502020204030204" pitchFamily="34" charset="0"/>
+              <a:ea typeface="Calibri" panose="020F0502020204030204" pitchFamily="34" charset="0"/>
+              <a:cs typeface="Times New Roman" panose="02020603050405020304" pitchFamily="18" charset="0"/>
+            </a:endParaRPr>
+          </a:p>
+          <a:p>
+            <a:pPr marL="0" indent="0">
+              <a:buNone/>
+            </a:pPr>
+            <a:r>
+              <a:rPr lang="en-US" sz="3600" dirty="0" err="1"/>
+              <a:t>Github</a:t>
+            </a:r>
+            <a:r>
+              <a:rPr lang="en-US" sz="3600" dirty="0"/>
+              <a:t> link: </a:t>
+            </a:r>
+            <a:r>
+              <a:rPr lang="en-US" sz="1800" u="sng" kern="100" dirty="0">
+                <a:solidFill>
+                  <a:srgbClr val="0563C1"/>
+                </a:solidFill>
+                <a:effectLst/>
+                <a:latin typeface="Calibri" panose="020F0502020204030204" pitchFamily="34" charset="0"/>
+                <a:ea typeface="Calibri" panose="020F0502020204030204" pitchFamily="34" charset="0"/>
+                <a:cs typeface="Times New Roman" panose="02020603050405020304" pitchFamily="18" charset="0"/>
+                <a:hlinkClick r:id="rId4"/>
+              </a:rPr>
+              <a:t>https://github.com/abdullahi682/diabetes-prediction-app</a:t>
+            </a:r>
+            <a:endParaRPr lang="en-US" sz="1800" kern="100" dirty="0">
+              <a:effectLst/>
+              <a:latin typeface="Calibri" panose="020F0502020204030204" pitchFamily="34" charset="0"/>
+              <a:ea typeface="Calibri" panose="020F0502020204030204" pitchFamily="34" charset="0"/>
+              <a:cs typeface="Times New Roman" panose="02020603050405020304" pitchFamily="18" charset="0"/>
+            </a:endParaRPr>
+          </a:p>
+          <a:p>
+            <a:pPr marL="0" indent="0">
+              <a:buNone/>
+            </a:pPr>
+            <a:endParaRPr lang="en-US" sz="3600" dirty="0"/>
+          </a:p>
+          <a:p>
             <a:endParaRPr lang="en-US" sz="3600" dirty="0"/>
           </a:p>
           <a:p>

</xml_diff>